<commit_message>
ppt example & annotation modi
</commit_message>
<xml_diff>
--- a/MidtermPj_2018440017_김민석(제출용).pptx
+++ b/MidtermPj_2018440017_김민석(제출용).pptx
@@ -24817,7 +24817,7 @@
         </p:nvSpPr>
         <p:spPr>
           <a:xfrm>
-            <a:off x="803462" y="3534583"/>
+            <a:off x="803462" y="3596921"/>
             <a:ext cx="5415265" cy="369332"/>
           </a:xfrm>
           <a:prstGeom prst="rect">
@@ -24922,10 +24922,10 @@
       </p:sp>
       <p:pic>
         <p:nvPicPr>
-          <p:cNvPr id="33" name="그림 32">
+          <p:cNvPr id="6" name="그림 5">
             <a:extLst>
               <a:ext uri="{FF2B5EF4-FFF2-40B4-BE49-F238E27FC236}">
-                <a16:creationId xmlns:a16="http://schemas.microsoft.com/office/drawing/2014/main" id="{90EABAC0-5844-0817-AC21-A1DA9B8AAFCC}"/>
+                <a16:creationId xmlns:a16="http://schemas.microsoft.com/office/drawing/2014/main" id="{5CF3EDAA-6A71-B78E-45F0-4BD374A6175F}"/>
               </a:ext>
             </a:extLst>
           </p:cNvPr>
@@ -24942,8 +24942,8 @@
         </p:blipFill>
         <p:spPr>
           <a:xfrm>
-            <a:off x="1006663" y="4521377"/>
-            <a:ext cx="2235200" cy="863600"/>
+            <a:off x="1030176" y="4449841"/>
+            <a:ext cx="2388412" cy="1001592"/>
           </a:xfrm>
           <a:prstGeom prst="rect">
             <a:avLst/>
@@ -24952,10 +24952,10 @@
       </p:pic>
       <p:pic>
         <p:nvPicPr>
-          <p:cNvPr id="34" name="그림 33">
+          <p:cNvPr id="8" name="그림 7">
             <a:extLst>
               <a:ext uri="{FF2B5EF4-FFF2-40B4-BE49-F238E27FC236}">
-                <a16:creationId xmlns:a16="http://schemas.microsoft.com/office/drawing/2014/main" id="{EC7B7BC0-4BAC-2B09-A4D0-FDF840ECEB9B}"/>
+                <a16:creationId xmlns:a16="http://schemas.microsoft.com/office/drawing/2014/main" id="{4469D859-E1E2-3CB8-E07A-ACB5C753D495}"/>
               </a:ext>
             </a:extLst>
           </p:cNvPr>
@@ -24972,8 +24972,8 @@
         </p:blipFill>
         <p:spPr>
           <a:xfrm>
-            <a:off x="3266515" y="4521376"/>
-            <a:ext cx="962160" cy="2240253"/>
+            <a:off x="3536897" y="4449843"/>
+            <a:ext cx="1072807" cy="2408157"/>
           </a:xfrm>
           <a:prstGeom prst="rect">
             <a:avLst/>
@@ -24982,10 +24982,10 @@
       </p:pic>
       <p:pic>
         <p:nvPicPr>
-          <p:cNvPr id="35" name="그림 34">
+          <p:cNvPr id="9" name="그림 8">
             <a:extLst>
               <a:ext uri="{FF2B5EF4-FFF2-40B4-BE49-F238E27FC236}">
-                <a16:creationId xmlns:a16="http://schemas.microsoft.com/office/drawing/2014/main" id="{9AA4E8F9-2365-9543-F101-11DE750BC6B6}"/>
+                <a16:creationId xmlns:a16="http://schemas.microsoft.com/office/drawing/2014/main" id="{5F59F9D5-25AC-4A4E-EF89-BAC94FEFBA6F}"/>
               </a:ext>
             </a:extLst>
           </p:cNvPr>
@@ -25002,8 +25002,8 @@
         </p:blipFill>
         <p:spPr>
           <a:xfrm>
-            <a:off x="4253327" y="4507010"/>
-            <a:ext cx="841107" cy="2255992"/>
+            <a:off x="4728013" y="4449843"/>
+            <a:ext cx="1072807" cy="2416189"/>
           </a:xfrm>
           <a:prstGeom prst="rect">
             <a:avLst/>
@@ -25012,10 +25012,10 @@
       </p:pic>
       <p:pic>
         <p:nvPicPr>
-          <p:cNvPr id="36" name="그림 35">
+          <p:cNvPr id="10" name="그림 9">
             <a:extLst>
               <a:ext uri="{FF2B5EF4-FFF2-40B4-BE49-F238E27FC236}">
-                <a16:creationId xmlns:a16="http://schemas.microsoft.com/office/drawing/2014/main" id="{57102DB9-5B09-6309-5490-75DB16ED6480}"/>
+                <a16:creationId xmlns:a16="http://schemas.microsoft.com/office/drawing/2014/main" id="{2BBC0E35-0390-8FDB-EB38-39E963326D52}"/>
               </a:ext>
             </a:extLst>
           </p:cNvPr>
@@ -25032,50 +25032,74 @@
         </p:blipFill>
         <p:spPr>
           <a:xfrm>
-            <a:off x="5119087" y="4505637"/>
-            <a:ext cx="686606" cy="2255992"/>
+            <a:off x="5903042" y="4449841"/>
+            <a:ext cx="1072808" cy="2416191"/>
           </a:xfrm>
           <a:prstGeom prst="rect">
             <a:avLst/>
           </a:prstGeom>
         </p:spPr>
       </p:pic>
-      <p:sp>
-        <p:nvSpPr>
-          <p:cNvPr id="37" name="TextBox 36">
+      <p:pic>
+        <p:nvPicPr>
+          <p:cNvPr id="11" name="그림 10">
             <a:extLst>
               <a:ext uri="{FF2B5EF4-FFF2-40B4-BE49-F238E27FC236}">
-                <a16:creationId xmlns:a16="http://schemas.microsoft.com/office/drawing/2014/main" id="{FAC02587-E026-DEDA-AEA6-49D48E1D56B7}"/>
+                <a16:creationId xmlns:a16="http://schemas.microsoft.com/office/drawing/2014/main" id="{FE9BA117-C3F4-824E-5F9D-ACEE4D9BC150}"/>
               </a:ext>
             </a:extLst>
           </p:cNvPr>
-          <p:cNvSpPr txBox="1"/>
+          <p:cNvPicPr>
+            <a:picLocks noChangeAspect="1"/>
+          </p:cNvPicPr>
           <p:nvPr/>
-        </p:nvSpPr>
+        </p:nvPicPr>
+        <p:blipFill>
+          <a:blip r:embed="rId7"/>
+          <a:stretch>
+            <a:fillRect/>
+          </a:stretch>
+        </p:blipFill>
         <p:spPr>
           <a:xfrm>
-            <a:off x="5958459" y="5200311"/>
-            <a:ext cx="554960" cy="369332"/>
+            <a:off x="7122421" y="4449841"/>
+            <a:ext cx="1059152" cy="2416191"/>
           </a:xfrm>
           <a:prstGeom prst="rect">
             <a:avLst/>
           </a:prstGeom>
-          <a:noFill/>
         </p:spPr>
-        <p:txBody>
-          <a:bodyPr wrap="none" rtlCol="0">
-            <a:spAutoFit/>
-          </a:bodyPr>
-          <a:lstStyle/>
-          <a:p>
-            <a:r>
-              <a:rPr kumimoji="1" lang="en-US" altLang="ko-Kore-KR" dirty="0"/>
-              <a:t>… …</a:t>
-            </a:r>
-            <a:endParaRPr kumimoji="1" lang="ko-Kore-KR" altLang="en-US" dirty="0"/>
-          </a:p>
-        </p:txBody>
-      </p:sp>
+      </p:pic>
+      <p:pic>
+        <p:nvPicPr>
+          <p:cNvPr id="14" name="그림 13">
+            <a:extLst>
+              <a:ext uri="{FF2B5EF4-FFF2-40B4-BE49-F238E27FC236}">
+                <a16:creationId xmlns:a16="http://schemas.microsoft.com/office/drawing/2014/main" id="{0B98CA15-F932-E7DC-762E-DD0A43022C89}"/>
+              </a:ext>
+            </a:extLst>
+          </p:cNvPr>
+          <p:cNvPicPr>
+            <a:picLocks noChangeAspect="1"/>
+          </p:cNvPicPr>
+          <p:nvPr/>
+        </p:nvPicPr>
+        <p:blipFill>
+          <a:blip r:embed="rId8"/>
+          <a:stretch>
+            <a:fillRect/>
+          </a:stretch>
+        </p:blipFill>
+        <p:spPr>
+          <a:xfrm>
+            <a:off x="991262" y="5655342"/>
+            <a:ext cx="2443413" cy="266114"/>
+          </a:xfrm>
+          <a:prstGeom prst="rect">
+            <a:avLst/>
+          </a:prstGeom>
+        </p:spPr>
+      </p:pic>
     </p:spTree>
     <p:extLst>
       <p:ext uri="{BB962C8B-B14F-4D97-AF65-F5344CB8AC3E}">

</xml_diff>